<commit_message>
Presentation Weather Type Portion
</commit_message>
<xml_diff>
--- a/Group 7_PPT.pptx
+++ b/Group 7_PPT.pptx
@@ -212,7 +212,7 @@
           <a:p>
             <a:fld id="{6625A3C9-B04A-5442-A52B-6A15432CBDFA}" type="datetimeFigureOut">
               <a:rPr lang="en-US" smtClean="0"/>
-              <a:t>2/13/23</a:t>
+              <a:t>2/14/2023</a:t>
             </a:fld>
             <a:endParaRPr lang="en-US" dirty="0"/>
           </a:p>
@@ -1427,7 +1427,7 @@
           <a:p>
             <a:fld id="{85508C55-9CE1-164A-95A9-4EC692FB5E24}" type="datetime1">
               <a:rPr lang="en-US" smtClean="0"/>
-              <a:t>2/13/23</a:t>
+              <a:t>2/14/2023</a:t>
             </a:fld>
             <a:endParaRPr lang="en-US" dirty="0"/>
           </a:p>
@@ -2166,7 +2166,7 @@
           <a:p>
             <a:fld id="{04EABE68-C4B6-D24C-8D78-F690645F36AF}" type="datetime1">
               <a:rPr lang="en-US" smtClean="0"/>
-              <a:t>2/13/23</a:t>
+              <a:t>2/14/2023</a:t>
             </a:fld>
             <a:endParaRPr lang="en-US" dirty="0"/>
           </a:p>
@@ -2745,7 +2745,7 @@
           <a:p>
             <a:fld id="{558950F4-07C4-834F-A230-5DFF0C8EBAE3}" type="datetime1">
               <a:rPr lang="en-US" smtClean="0"/>
-              <a:t>2/13/23</a:t>
+              <a:t>2/14/2023</a:t>
             </a:fld>
             <a:endParaRPr lang="en-US" dirty="0"/>
           </a:p>
@@ -3294,7 +3294,7 @@
           <a:p>
             <a:fld id="{0A7B79E4-B97F-FB42-B791-7FC277B0A69D}" type="datetime1">
               <a:rPr lang="en-US" smtClean="0"/>
-              <a:t>2/13/23</a:t>
+              <a:t>2/14/2023</a:t>
             </a:fld>
             <a:endParaRPr lang="en-US" dirty="0"/>
           </a:p>
@@ -3997,7 +3997,7 @@
           <a:p>
             <a:fld id="{5004A8AF-3166-044D-8712-ACF9B2CB3AEE}" type="datetime1">
               <a:rPr lang="en-US" smtClean="0"/>
-              <a:t>2/13/23</a:t>
+              <a:t>2/14/2023</a:t>
             </a:fld>
             <a:endParaRPr lang="en-US" dirty="0"/>
           </a:p>
@@ -5105,7 +5105,7 @@
           <a:p>
             <a:fld id="{2E74BC19-9A50-434A-B6C6-8443BCEF4D2C}" type="datetime1">
               <a:rPr lang="en-US" smtClean="0"/>
-              <a:t>2/13/23</a:t>
+              <a:t>2/14/2023</a:t>
             </a:fld>
             <a:endParaRPr lang="en-US" dirty="0"/>
           </a:p>
@@ -5348,7 +5348,7 @@
           <a:p>
             <a:fld id="{65D9F640-EA82-A543-89EC-580E11A1B194}" type="datetime1">
               <a:rPr lang="en-US" smtClean="0"/>
-              <a:t>2/13/23</a:t>
+              <a:t>2/14/2023</a:t>
             </a:fld>
             <a:endParaRPr lang="en-US" dirty="0"/>
           </a:p>
@@ -8630,7 +8630,7 @@
         </p:nvSpPr>
         <p:spPr>
           <a:xfrm>
-            <a:off x="9772153" y="105765"/>
+            <a:off x="9764202" y="330877"/>
             <a:ext cx="2411896" cy="3501681"/>
           </a:xfrm>
           <a:prstGeom prst="rect">
@@ -8666,7 +8666,7 @@
           <a:lstStyle/>
           <a:p>
             <a:pPr algn="ctr"/>
-            <a:endParaRPr lang="en-US"/>
+            <a:endParaRPr lang="en-US" dirty="0"/>
           </a:p>
         </p:txBody>
       </p:sp>
@@ -8688,7 +8688,7 @@
         </p:nvSpPr>
         <p:spPr>
           <a:xfrm>
-            <a:off x="9772153" y="81916"/>
+            <a:off x="9918203" y="1393405"/>
             <a:ext cx="1908313" cy="1117600"/>
           </a:xfrm>
         </p:spPr>
@@ -8698,7 +8698,53 @@
           <a:p>
             <a:r>
               <a:rPr lang="en-US" dirty="0"/>
-              <a:t>PLACEHOLDER</a:t>
+              <a:t>Regression plots show strong correlation between Trip Distance and fare as expected. The following are the r Values:</a:t>
+            </a:r>
+          </a:p>
+          <a:p>
+            <a:pPr marL="171450" indent="-171450">
+              <a:buFontTx/>
+              <a:buChar char="-"/>
+            </a:pPr>
+            <a:r>
+              <a:rPr lang="en-US" dirty="0"/>
+              <a:t>Clear weather: 0.78</a:t>
+            </a:r>
+          </a:p>
+          <a:p>
+            <a:pPr marL="171450" indent="-171450">
+              <a:buFontTx/>
+              <a:buChar char="-"/>
+            </a:pPr>
+            <a:r>
+              <a:rPr lang="en-US" dirty="0"/>
+              <a:t>Cloudy weather: 0.82</a:t>
+            </a:r>
+          </a:p>
+          <a:p>
+            <a:pPr marL="171450" indent="-171450">
+              <a:buFontTx/>
+              <a:buChar char="-"/>
+            </a:pPr>
+            <a:r>
+              <a:rPr lang="en-US" dirty="0"/>
+              <a:t>Snowy weather: 0.85</a:t>
+            </a:r>
+          </a:p>
+          <a:p>
+            <a:pPr marL="171450" indent="-171450">
+              <a:buFontTx/>
+              <a:buChar char="-"/>
+            </a:pPr>
+            <a:r>
+              <a:rPr lang="en-US" dirty="0"/>
+              <a:t>Rainy weather: 0.82</a:t>
+            </a:r>
+          </a:p>
+          <a:p>
+            <a:r>
+              <a:rPr lang="en-US" dirty="0"/>
+              <a:t>This suggests prices might be higher during Cloudy, Snowy and Rainy weather. Further statistical analysis follows</a:t>
             </a:r>
           </a:p>
         </p:txBody>
@@ -8784,8 +8830,8 @@
         </p:nvSpPr>
         <p:spPr>
           <a:xfrm>
-            <a:off x="5281547" y="1741041"/>
-            <a:ext cx="3584575" cy="1117600"/>
+            <a:off x="5528603" y="2523374"/>
+            <a:ext cx="3584575" cy="792916"/>
           </a:xfrm>
         </p:spPr>
         <p:txBody>
@@ -8793,8 +8839,34 @@
           <a:lstStyle/>
           <a:p>
             <a:r>
-              <a:rPr lang="en-US" dirty="0"/>
-              <a:t>NULL HYPOTHESIS</a:t>
+              <a:rPr lang="en-US" sz="800" dirty="0"/>
+              <a:t>NULL HYPOTHESIS: There is no Statistically significant effect of Weather Type on Average Fare Amount and Average Trip Distance</a:t>
+            </a:r>
+          </a:p>
+          <a:p>
+            <a:r>
+              <a:rPr lang="en-US" sz="800" dirty="0"/>
+              <a:t>We Carried out </a:t>
+            </a:r>
+            <a:r>
+              <a:rPr lang="en-US" sz="800" dirty="0" err="1"/>
+              <a:t>anova</a:t>
+            </a:r>
+            <a:r>
+              <a:rPr lang="en-US" sz="800" dirty="0"/>
+              <a:t> tests between the various weather types with regard to Average fare and average distance</a:t>
+            </a:r>
+          </a:p>
+          <a:p>
+            <a:r>
+              <a:rPr lang="en-US" sz="800" dirty="0"/>
+              <a:t>P-Value for average fare: 0.92</a:t>
+            </a:r>
+          </a:p>
+          <a:p>
+            <a:r>
+              <a:rPr lang="en-US" sz="800" dirty="0"/>
+              <a:t>P-Value for average distance: 0.92</a:t>
             </a:r>
           </a:p>
         </p:txBody>
@@ -8821,8 +8893,8 @@
         </p:blipFill>
         <p:spPr>
           <a:xfrm>
-            <a:off x="0" y="1328199"/>
-            <a:ext cx="5036109" cy="2158332"/>
+            <a:off x="0" y="1213022"/>
+            <a:ext cx="5036109" cy="2469978"/>
           </a:xfrm>
           <a:prstGeom prst="rect">
             <a:avLst/>
@@ -8880,7 +8952,7 @@
         </p:blipFill>
         <p:spPr>
           <a:xfrm>
-            <a:off x="5375083" y="48039"/>
+            <a:off x="5375083" y="8755"/>
             <a:ext cx="4303534" cy="1844371"/>
           </a:xfrm>
           <a:prstGeom prst="rect">
@@ -8967,7 +9039,7 @@
           <a:lstStyle/>
           <a:p>
             <a:pPr algn="ctr"/>
-            <a:endParaRPr lang="en-US"/>
+            <a:endParaRPr lang="en-US" dirty="0"/>
           </a:p>
         </p:txBody>
       </p:sp>
@@ -8987,7 +9059,7 @@
         </p:nvSpPr>
         <p:spPr>
           <a:xfrm>
-            <a:off x="9835763" y="2398"/>
+            <a:off x="9893258" y="1213021"/>
             <a:ext cx="1908313" cy="1117600"/>
           </a:xfrm>
           <a:prstGeom prst="rect">
@@ -9165,7 +9237,21 @@
           <a:p>
             <a:r>
               <a:rPr lang="en-US" dirty="0"/>
-              <a:t>CONCLUSION</a:t>
+              <a:t>CONCLUSION: The </a:t>
+            </a:r>
+            <a:r>
+              <a:rPr lang="en-US" dirty="0" err="1"/>
+              <a:t>anova</a:t>
+            </a:r>
+            <a:r>
+              <a:rPr lang="en-US" dirty="0"/>
+              <a:t> tests returned p-Values greater than 0.05 for the different Groupings of weather types for both average fare and average trip distance.</a:t>
+            </a:r>
+          </a:p>
+          <a:p>
+            <a:r>
+              <a:rPr lang="en-US" dirty="0"/>
+              <a:t>We could not reject the null hypothesis/establish a firm link between weather type and fare amount or trip distance.</a:t>
             </a:r>
           </a:p>
         </p:txBody>
@@ -10394,26 +10480,6 @@
 </file>
 
 <file path=customXml/item1.xml><?xml version="1.0" encoding="utf-8"?>
-<p:properties xmlns:p="http://schemas.microsoft.com/office/2006/metadata/properties" xmlns:xsi="http://www.w3.org/2001/XMLSchema-instance" xmlns:pc="http://schemas.microsoft.com/office/infopath/2007/PartnerControls">
-  <documentManagement>
-    <_ip_UnifiedCompliancePolicyUIAction xmlns="http://schemas.microsoft.com/sharepoint/v3" xsi:nil="true"/>
-    <Image xmlns="71af3243-3dd4-4a8d-8c0d-dd76da1f02a5">
-      <Url xsi:nil="true"/>
-      <Description xsi:nil="true"/>
-    </Image>
-    <Status xmlns="71af3243-3dd4-4a8d-8c0d-dd76da1f02a5">Not started</Status>
-    <Background xmlns="71af3243-3dd4-4a8d-8c0d-dd76da1f02a5">false</Background>
-    <_ip_UnifiedCompliancePolicyProperties xmlns="http://schemas.microsoft.com/sharepoint/v3" xsi:nil="true"/>
-    <ImageTagsTaxHTField xmlns="71af3243-3dd4-4a8d-8c0d-dd76da1f02a5">
-      <Terms xmlns="http://schemas.microsoft.com/office/infopath/2007/PartnerControls"/>
-    </ImageTagsTaxHTField>
-    <TaxCatchAll xmlns="230e9df3-be65-4c73-a93b-d1236ebd677e" xsi:nil="true"/>
-    <MediaServiceKeyPoints xmlns="71af3243-3dd4-4a8d-8c0d-dd76da1f02a5" xsi:nil="true"/>
-  </documentManagement>
-</p:properties>
-</file>
-
-<file path=customXml/item2.xml><?xml version="1.0" encoding="utf-8"?>
 <ct:contentTypeSchema xmlns:ct="http://schemas.microsoft.com/office/2006/metadata/contentType" xmlns:ma="http://schemas.microsoft.com/office/2006/metadata/properties/metaAttributes" ct:_="" ma:_="" ma:contentTypeName="Document" ma:contentTypeID="0x01010079F111ED35F8CC479449609E8A0923A6" ma:contentTypeVersion="26" ma:contentTypeDescription="Create a new document." ma:contentTypeScope="" ma:versionID="ac37c1753acd5e330d2062ccec26ea66">
   <xsd:schema xmlns:xsd="http://www.w3.org/2001/XMLSchema" xmlns:xs="http://www.w3.org/2001/XMLSchema" xmlns:p="http://schemas.microsoft.com/office/2006/metadata/properties" xmlns:ns1="http://schemas.microsoft.com/sharepoint/v3" xmlns:ns2="71af3243-3dd4-4a8d-8c0d-dd76da1f02a5" xmlns:ns3="16c05727-aa75-4e4a-9b5f-8a80a1165891" xmlns:ns4="230e9df3-be65-4c73-a93b-d1236ebd677e" targetNamespace="http://schemas.microsoft.com/office/2006/metadata/properties" ma:root="true" ma:fieldsID="3b340c7101c92c5120abd06486f94548" ns1:_="" ns2:_="" ns3:_="" ns4:_="">
     <xsd:import namespace="http://schemas.microsoft.com/sharepoint/v3"/>
@@ -10713,6 +10779,26 @@
 </ct:contentTypeSchema>
 </file>
 
+<file path=customXml/item2.xml><?xml version="1.0" encoding="utf-8"?>
+<p:properties xmlns:p="http://schemas.microsoft.com/office/2006/metadata/properties" xmlns:xsi="http://www.w3.org/2001/XMLSchema-instance" xmlns:pc="http://schemas.microsoft.com/office/infopath/2007/PartnerControls">
+  <documentManagement>
+    <_ip_UnifiedCompliancePolicyUIAction xmlns="http://schemas.microsoft.com/sharepoint/v3" xsi:nil="true"/>
+    <Image xmlns="71af3243-3dd4-4a8d-8c0d-dd76da1f02a5">
+      <Url xsi:nil="true"/>
+      <Description xsi:nil="true"/>
+    </Image>
+    <Status xmlns="71af3243-3dd4-4a8d-8c0d-dd76da1f02a5">Not started</Status>
+    <Background xmlns="71af3243-3dd4-4a8d-8c0d-dd76da1f02a5">false</Background>
+    <_ip_UnifiedCompliancePolicyProperties xmlns="http://schemas.microsoft.com/sharepoint/v3" xsi:nil="true"/>
+    <ImageTagsTaxHTField xmlns="71af3243-3dd4-4a8d-8c0d-dd76da1f02a5">
+      <Terms xmlns="http://schemas.microsoft.com/office/infopath/2007/PartnerControls"/>
+    </ImageTagsTaxHTField>
+    <TaxCatchAll xmlns="230e9df3-be65-4c73-a93b-d1236ebd677e" xsi:nil="true"/>
+    <MediaServiceKeyPoints xmlns="71af3243-3dd4-4a8d-8c0d-dd76da1f02a5" xsi:nil="true"/>
+  </documentManagement>
+</p:properties>
+</file>
+
 <file path=customXml/item3.xml><?xml version="1.0" encoding="utf-8"?>
 <?mso-contentType ?>
 <FormTemplates xmlns="http://schemas.microsoft.com/sharepoint/v3/contenttype/forms">
@@ -10723,18 +10809,6 @@
 </file>
 
 <file path=customXml/itemProps1.xml><?xml version="1.0" encoding="utf-8"?>
-<ds:datastoreItem xmlns:ds="http://schemas.openxmlformats.org/officeDocument/2006/customXml" ds:itemID="{69647463-BB85-435C-ACAF-E187D6AD5544}">
-  <ds:schemaRefs>
-    <ds:schemaRef ds:uri="http://schemas.microsoft.com/office/2006/metadata/properties"/>
-    <ds:schemaRef ds:uri="http://schemas.microsoft.com/office/infopath/2007/PartnerControls"/>
-    <ds:schemaRef ds:uri="http://schemas.microsoft.com/sharepoint/v3"/>
-    <ds:schemaRef ds:uri="71af3243-3dd4-4a8d-8c0d-dd76da1f02a5"/>
-    <ds:schemaRef ds:uri="230e9df3-be65-4c73-a93b-d1236ebd677e"/>
-  </ds:schemaRefs>
-</ds:datastoreItem>
-</file>
-
-<file path=customXml/itemProps2.xml><?xml version="1.0" encoding="utf-8"?>
 <ds:datastoreItem xmlns:ds="http://schemas.openxmlformats.org/officeDocument/2006/customXml" ds:itemID="{9DAB7211-A234-4C14-A897-00A0068F7BC1}">
   <ds:schemaRefs>
     <ds:schemaRef ds:uri="http://schemas.microsoft.com/office/2006/metadata/contentType"/>
@@ -10755,6 +10829,18 @@
 </ds:datastoreItem>
 </file>
 
+<file path=customXml/itemProps2.xml><?xml version="1.0" encoding="utf-8"?>
+<ds:datastoreItem xmlns:ds="http://schemas.openxmlformats.org/officeDocument/2006/customXml" ds:itemID="{69647463-BB85-435C-ACAF-E187D6AD5544}">
+  <ds:schemaRefs>
+    <ds:schemaRef ds:uri="http://schemas.microsoft.com/office/2006/metadata/properties"/>
+    <ds:schemaRef ds:uri="http://schemas.microsoft.com/office/infopath/2007/PartnerControls"/>
+    <ds:schemaRef ds:uri="http://schemas.microsoft.com/sharepoint/v3"/>
+    <ds:schemaRef ds:uri="71af3243-3dd4-4a8d-8c0d-dd76da1f02a5"/>
+    <ds:schemaRef ds:uri="230e9df3-be65-4c73-a93b-d1236ebd677e"/>
+  </ds:schemaRefs>
+</ds:datastoreItem>
+</file>
+
 <file path=customXml/itemProps3.xml><?xml version="1.0" encoding="utf-8"?>
 <ds:datastoreItem xmlns:ds="http://schemas.openxmlformats.org/officeDocument/2006/customXml" ds:itemID="{49688DC5-792D-46CC-A1E4-D79B0E835122}">
   <ds:schemaRefs>

</xml_diff>